<commit_message>
agregado estado del arte
</commit_message>
<xml_diff>
--- a/DIAPOSITIVAS RESUMEN EJECUTIVO.pptx
+++ b/DIAPOSITIVAS RESUMEN EJECUTIVO.pptx
@@ -119,6 +119,22 @@
       </a:defRPr>
     </a:lvl9pPr>
   </p:defaultTextStyle>
+  <p:extLst>
+    <p:ext uri="{EFAFB233-063F-42B5-8137-9DF3F51BA10A}">
+      <p15:sldGuideLst xmlns:p15="http://schemas.microsoft.com/office/powerpoint/2012/main">
+        <p15:guide id="1" orient="horz" pos="2160">
+          <p15:clr>
+            <a:srgbClr val="A4A3A4"/>
+          </p15:clr>
+        </p15:guide>
+        <p15:guide id="2" pos="2880">
+          <p15:clr>
+            <a:srgbClr val="A4A3A4"/>
+          </p15:clr>
+        </p15:guide>
+      </p15:sldGuideLst>
+    </p:ext>
+  </p:extLst>
 </p:presentation>
 </file>
 
@@ -204,7 +220,7 @@
           <a:p>
             <a:fld id="{079F7667-8BB7-E840-9EC3-78F0A51DC494}" type="datetimeFigureOut">
               <a:rPr lang="es-ES" smtClean="0"/>
-              <a:t>02/06/16</a:t>
+              <a:t>12/06/2016</a:t>
             </a:fld>
             <a:endParaRPr lang="es-ES"/>
           </a:p>
@@ -268,35 +284,35 @@
           <a:p>
             <a:pPr lvl="0"/>
             <a:r>
-              <a:rPr lang="es-ES_tradnl" smtClean="0"/>
+              <a:rPr lang="es-ES_tradnl"/>
               <a:t>Haga clic para modificar el estilo de texto del patrón</a:t>
             </a:r>
           </a:p>
           <a:p>
             <a:pPr lvl="1"/>
             <a:r>
-              <a:rPr lang="es-ES_tradnl" smtClean="0"/>
+              <a:rPr lang="es-ES_tradnl"/>
               <a:t>Segundo nivel</a:t>
             </a:r>
           </a:p>
           <a:p>
             <a:pPr lvl="2"/>
             <a:r>
-              <a:rPr lang="es-ES_tradnl" smtClean="0"/>
+              <a:rPr lang="es-ES_tradnl"/>
               <a:t>Tercer nivel</a:t>
             </a:r>
           </a:p>
           <a:p>
             <a:pPr lvl="3"/>
             <a:r>
-              <a:rPr lang="es-ES_tradnl" smtClean="0"/>
+              <a:rPr lang="es-ES_tradnl"/>
               <a:t>Cuarto nivel</a:t>
             </a:r>
           </a:p>
           <a:p>
             <a:pPr lvl="4"/>
             <a:r>
-              <a:rPr lang="es-ES_tradnl" smtClean="0"/>
+              <a:rPr lang="es-ES_tradnl"/>
               <a:t>Quinto nivel</a:t>
             </a:r>
             <a:endParaRPr lang="es-ES"/>
@@ -363,7 +379,7 @@
           <a:p>
             <a:fld id="{DEAF164F-93DD-2642-A5E4-05B7AD3D961E}" type="slidenum">
               <a:rPr lang="es-ES" smtClean="0"/>
-              <a:t>‹Nr.›</a:t>
+              <a:t>‹Nº›</a:t>
             </a:fld>
             <a:endParaRPr lang="es-ES"/>
           </a:p>
@@ -1199,7 +1215,7 @@
           <a:lstStyle/>
           <a:p>
             <a:r>
-              <a:rPr lang="es-ES_tradnl" smtClean="0"/>
+              <a:rPr lang="es-ES_tradnl"/>
               <a:t>Clic para editar título</a:t>
             </a:r>
             <a:endParaRPr lang="es-ES"/>
@@ -1318,7 +1334,7 @@
           </a:lstStyle>
           <a:p>
             <a:r>
-              <a:rPr lang="es-ES_tradnl" smtClean="0"/>
+              <a:rPr lang="es-ES_tradnl"/>
               <a:t>Haga clic para modificar el estilo de subtítulo del patrón</a:t>
             </a:r>
             <a:endParaRPr lang="es-ES"/>
@@ -1351,7 +1367,7 @@
             <a:fld id="{2913CB40-C103-A642-9FFE-7E469F79BBD1}" type="datetimeFigureOut">
               <a:rPr lang="es-ES" smtClean="0"/>
               <a:pPr/>
-              <a:t>02/06/16</a:t>
+              <a:t>12/06/2016</a:t>
             </a:fld>
             <a:endParaRPr lang="es-ES"/>
           </a:p>
@@ -1410,7 +1426,7 @@
             <a:fld id="{DF0D5ED5-5AB1-0148-B4D4-4EA695B82FB8}" type="slidenum">
               <a:rPr lang="es-ES" smtClean="0"/>
               <a:pPr/>
-              <a:t>‹Nr.›</a:t>
+              <a:t>‹Nº›</a:t>
             </a:fld>
             <a:endParaRPr lang="es-ES"/>
           </a:p>
@@ -1462,7 +1478,7 @@
           <a:lstStyle/>
           <a:p>
             <a:r>
-              <a:rPr lang="es-ES_tradnl" smtClean="0"/>
+              <a:rPr lang="es-ES_tradnl"/>
               <a:t>Clic para editar título</a:t>
             </a:r>
             <a:endParaRPr lang="es-ES"/>
@@ -1486,35 +1502,35 @@
           <a:p>
             <a:pPr lvl="0"/>
             <a:r>
-              <a:rPr lang="es-ES_tradnl" smtClean="0"/>
+              <a:rPr lang="es-ES_tradnl"/>
               <a:t>Haga clic para modificar el estilo de texto del patrón</a:t>
             </a:r>
           </a:p>
           <a:p>
             <a:pPr lvl="1"/>
             <a:r>
-              <a:rPr lang="es-ES_tradnl" smtClean="0"/>
+              <a:rPr lang="es-ES_tradnl"/>
               <a:t>Segundo nivel</a:t>
             </a:r>
           </a:p>
           <a:p>
             <a:pPr lvl="2"/>
             <a:r>
-              <a:rPr lang="es-ES_tradnl" smtClean="0"/>
+              <a:rPr lang="es-ES_tradnl"/>
               <a:t>Tercer nivel</a:t>
             </a:r>
           </a:p>
           <a:p>
             <a:pPr lvl="3"/>
             <a:r>
-              <a:rPr lang="es-ES_tradnl" smtClean="0"/>
+              <a:rPr lang="es-ES_tradnl"/>
               <a:t>Cuarto nivel</a:t>
             </a:r>
           </a:p>
           <a:p>
             <a:pPr lvl="4"/>
             <a:r>
-              <a:rPr lang="es-ES_tradnl" smtClean="0"/>
+              <a:rPr lang="es-ES_tradnl"/>
               <a:t>Quinto nivel</a:t>
             </a:r>
             <a:endParaRPr lang="es-ES"/>
@@ -1547,7 +1563,7 @@
             <a:fld id="{2913CB40-C103-A642-9FFE-7E469F79BBD1}" type="datetimeFigureOut">
               <a:rPr lang="es-ES" smtClean="0"/>
               <a:pPr/>
-              <a:t>02/06/16</a:t>
+              <a:t>12/06/2016</a:t>
             </a:fld>
             <a:endParaRPr lang="es-ES"/>
           </a:p>
@@ -1606,7 +1622,7 @@
             <a:fld id="{DF0D5ED5-5AB1-0148-B4D4-4EA695B82FB8}" type="slidenum">
               <a:rPr lang="es-ES" smtClean="0"/>
               <a:pPr/>
-              <a:t>‹Nr.›</a:t>
+              <a:t>‹Nº›</a:t>
             </a:fld>
             <a:endParaRPr lang="es-ES"/>
           </a:p>
@@ -1663,7 +1679,7 @@
           <a:lstStyle/>
           <a:p>
             <a:r>
-              <a:rPr lang="es-ES_tradnl" smtClean="0"/>
+              <a:rPr lang="es-ES_tradnl"/>
               <a:t>Clic para editar título</a:t>
             </a:r>
             <a:endParaRPr lang="es-ES"/>
@@ -1692,35 +1708,35 @@
           <a:p>
             <a:pPr lvl="0"/>
             <a:r>
-              <a:rPr lang="es-ES_tradnl" smtClean="0"/>
+              <a:rPr lang="es-ES_tradnl"/>
               <a:t>Haga clic para modificar el estilo de texto del patrón</a:t>
             </a:r>
           </a:p>
           <a:p>
             <a:pPr lvl="1"/>
             <a:r>
-              <a:rPr lang="es-ES_tradnl" smtClean="0"/>
+              <a:rPr lang="es-ES_tradnl"/>
               <a:t>Segundo nivel</a:t>
             </a:r>
           </a:p>
           <a:p>
             <a:pPr lvl="2"/>
             <a:r>
-              <a:rPr lang="es-ES_tradnl" smtClean="0"/>
+              <a:rPr lang="es-ES_tradnl"/>
               <a:t>Tercer nivel</a:t>
             </a:r>
           </a:p>
           <a:p>
             <a:pPr lvl="3"/>
             <a:r>
-              <a:rPr lang="es-ES_tradnl" smtClean="0"/>
+              <a:rPr lang="es-ES_tradnl"/>
               <a:t>Cuarto nivel</a:t>
             </a:r>
           </a:p>
           <a:p>
             <a:pPr lvl="4"/>
             <a:r>
-              <a:rPr lang="es-ES_tradnl" smtClean="0"/>
+              <a:rPr lang="es-ES_tradnl"/>
               <a:t>Quinto nivel</a:t>
             </a:r>
             <a:endParaRPr lang="es-ES"/>
@@ -1753,7 +1769,7 @@
             <a:fld id="{2913CB40-C103-A642-9FFE-7E469F79BBD1}" type="datetimeFigureOut">
               <a:rPr lang="es-ES" smtClean="0"/>
               <a:pPr/>
-              <a:t>02/06/16</a:t>
+              <a:t>12/06/2016</a:t>
             </a:fld>
             <a:endParaRPr lang="es-ES"/>
           </a:p>
@@ -1812,7 +1828,7 @@
             <a:fld id="{DF0D5ED5-5AB1-0148-B4D4-4EA695B82FB8}" type="slidenum">
               <a:rPr lang="es-ES" smtClean="0"/>
               <a:pPr/>
-              <a:t>‹Nr.›</a:t>
+              <a:t>‹Nº›</a:t>
             </a:fld>
             <a:endParaRPr lang="es-ES"/>
           </a:p>
@@ -1864,7 +1880,7 @@
           <a:lstStyle/>
           <a:p>
             <a:r>
-              <a:rPr lang="es-ES_tradnl" smtClean="0"/>
+              <a:rPr lang="es-ES_tradnl"/>
               <a:t>Clic para editar título</a:t>
             </a:r>
             <a:endParaRPr lang="es-ES"/>
@@ -1888,35 +1904,35 @@
           <a:p>
             <a:pPr lvl="0"/>
             <a:r>
-              <a:rPr lang="es-ES_tradnl" smtClean="0"/>
+              <a:rPr lang="es-ES_tradnl"/>
               <a:t>Haga clic para modificar el estilo de texto del patrón</a:t>
             </a:r>
           </a:p>
           <a:p>
             <a:pPr lvl="1"/>
             <a:r>
-              <a:rPr lang="es-ES_tradnl" smtClean="0"/>
+              <a:rPr lang="es-ES_tradnl"/>
               <a:t>Segundo nivel</a:t>
             </a:r>
           </a:p>
           <a:p>
             <a:pPr lvl="2"/>
             <a:r>
-              <a:rPr lang="es-ES_tradnl" smtClean="0"/>
+              <a:rPr lang="es-ES_tradnl"/>
               <a:t>Tercer nivel</a:t>
             </a:r>
           </a:p>
           <a:p>
             <a:pPr lvl="3"/>
             <a:r>
-              <a:rPr lang="es-ES_tradnl" smtClean="0"/>
+              <a:rPr lang="es-ES_tradnl"/>
               <a:t>Cuarto nivel</a:t>
             </a:r>
           </a:p>
           <a:p>
             <a:pPr lvl="4"/>
             <a:r>
-              <a:rPr lang="es-ES_tradnl" smtClean="0"/>
+              <a:rPr lang="es-ES_tradnl"/>
               <a:t>Quinto nivel</a:t>
             </a:r>
             <a:endParaRPr lang="es-ES"/>
@@ -1949,7 +1965,7 @@
             <a:fld id="{2913CB40-C103-A642-9FFE-7E469F79BBD1}" type="datetimeFigureOut">
               <a:rPr lang="es-ES" smtClean="0"/>
               <a:pPr/>
-              <a:t>02/06/16</a:t>
+              <a:t>12/06/2016</a:t>
             </a:fld>
             <a:endParaRPr lang="es-ES"/>
           </a:p>
@@ -2008,7 +2024,7 @@
             <a:fld id="{DF0D5ED5-5AB1-0148-B4D4-4EA695B82FB8}" type="slidenum">
               <a:rPr lang="es-ES" smtClean="0"/>
               <a:pPr/>
-              <a:t>‹Nr.›</a:t>
+              <a:t>‹Nº›</a:t>
             </a:fld>
             <a:endParaRPr lang="es-ES"/>
           </a:p>
@@ -2069,7 +2085,7 @@
           </a:lstStyle>
           <a:p>
             <a:r>
-              <a:rPr lang="es-ES_tradnl" smtClean="0"/>
+              <a:rPr lang="es-ES_tradnl"/>
               <a:t>Clic para editar título</a:t>
             </a:r>
             <a:endParaRPr lang="es-ES"/>
@@ -2189,7 +2205,7 @@
           <a:p>
             <a:pPr lvl="0"/>
             <a:r>
-              <a:rPr lang="es-ES_tradnl" smtClean="0"/>
+              <a:rPr lang="es-ES_tradnl"/>
               <a:t>Haga clic para modificar el estilo de texto del patrón</a:t>
             </a:r>
           </a:p>
@@ -2221,7 +2237,7 @@
             <a:fld id="{2913CB40-C103-A642-9FFE-7E469F79BBD1}" type="datetimeFigureOut">
               <a:rPr lang="es-ES" smtClean="0"/>
               <a:pPr/>
-              <a:t>02/06/16</a:t>
+              <a:t>12/06/2016</a:t>
             </a:fld>
             <a:endParaRPr lang="es-ES"/>
           </a:p>
@@ -2280,7 +2296,7 @@
             <a:fld id="{DF0D5ED5-5AB1-0148-B4D4-4EA695B82FB8}" type="slidenum">
               <a:rPr lang="es-ES" smtClean="0"/>
               <a:pPr/>
-              <a:t>‹Nr.›</a:t>
+              <a:t>‹Nº›</a:t>
             </a:fld>
             <a:endParaRPr lang="es-ES"/>
           </a:p>
@@ -2332,7 +2348,7 @@
           <a:lstStyle/>
           <a:p>
             <a:r>
-              <a:rPr lang="es-ES_tradnl" smtClean="0"/>
+              <a:rPr lang="es-ES_tradnl"/>
               <a:t>Clic para editar título</a:t>
             </a:r>
             <a:endParaRPr lang="es-ES"/>
@@ -2389,35 +2405,35 @@
           <a:p>
             <a:pPr lvl="0"/>
             <a:r>
-              <a:rPr lang="es-ES_tradnl" smtClean="0"/>
+              <a:rPr lang="es-ES_tradnl"/>
               <a:t>Haga clic para modificar el estilo de texto del patrón</a:t>
             </a:r>
           </a:p>
           <a:p>
             <a:pPr lvl="1"/>
             <a:r>
-              <a:rPr lang="es-ES_tradnl" smtClean="0"/>
+              <a:rPr lang="es-ES_tradnl"/>
               <a:t>Segundo nivel</a:t>
             </a:r>
           </a:p>
           <a:p>
             <a:pPr lvl="2"/>
             <a:r>
-              <a:rPr lang="es-ES_tradnl" smtClean="0"/>
+              <a:rPr lang="es-ES_tradnl"/>
               <a:t>Tercer nivel</a:t>
             </a:r>
           </a:p>
           <a:p>
             <a:pPr lvl="3"/>
             <a:r>
-              <a:rPr lang="es-ES_tradnl" smtClean="0"/>
+              <a:rPr lang="es-ES_tradnl"/>
               <a:t>Cuarto nivel</a:t>
             </a:r>
           </a:p>
           <a:p>
             <a:pPr lvl="4"/>
             <a:r>
-              <a:rPr lang="es-ES_tradnl" smtClean="0"/>
+              <a:rPr lang="es-ES_tradnl"/>
               <a:t>Quinto nivel</a:t>
             </a:r>
             <a:endParaRPr lang="es-ES"/>
@@ -2474,35 +2490,35 @@
           <a:p>
             <a:pPr lvl="0"/>
             <a:r>
-              <a:rPr lang="es-ES_tradnl" smtClean="0"/>
+              <a:rPr lang="es-ES_tradnl"/>
               <a:t>Haga clic para modificar el estilo de texto del patrón</a:t>
             </a:r>
           </a:p>
           <a:p>
             <a:pPr lvl="1"/>
             <a:r>
-              <a:rPr lang="es-ES_tradnl" smtClean="0"/>
+              <a:rPr lang="es-ES_tradnl"/>
               <a:t>Segundo nivel</a:t>
             </a:r>
           </a:p>
           <a:p>
             <a:pPr lvl="2"/>
             <a:r>
-              <a:rPr lang="es-ES_tradnl" smtClean="0"/>
+              <a:rPr lang="es-ES_tradnl"/>
               <a:t>Tercer nivel</a:t>
             </a:r>
           </a:p>
           <a:p>
             <a:pPr lvl="3"/>
             <a:r>
-              <a:rPr lang="es-ES_tradnl" smtClean="0"/>
+              <a:rPr lang="es-ES_tradnl"/>
               <a:t>Cuarto nivel</a:t>
             </a:r>
           </a:p>
           <a:p>
             <a:pPr lvl="4"/>
             <a:r>
-              <a:rPr lang="es-ES_tradnl" smtClean="0"/>
+              <a:rPr lang="es-ES_tradnl"/>
               <a:t>Quinto nivel</a:t>
             </a:r>
             <a:endParaRPr lang="es-ES"/>
@@ -2535,7 +2551,7 @@
             <a:fld id="{2913CB40-C103-A642-9FFE-7E469F79BBD1}" type="datetimeFigureOut">
               <a:rPr lang="es-ES" smtClean="0"/>
               <a:pPr/>
-              <a:t>02/06/16</a:t>
+              <a:t>12/06/2016</a:t>
             </a:fld>
             <a:endParaRPr lang="es-ES"/>
           </a:p>
@@ -2594,7 +2610,7 @@
             <a:fld id="{DF0D5ED5-5AB1-0148-B4D4-4EA695B82FB8}" type="slidenum">
               <a:rPr lang="es-ES" smtClean="0"/>
               <a:pPr/>
-              <a:t>‹Nr.›</a:t>
+              <a:t>‹Nº›</a:t>
             </a:fld>
             <a:endParaRPr lang="es-ES"/>
           </a:p>
@@ -2650,7 +2666,7 @@
           </a:lstStyle>
           <a:p>
             <a:r>
-              <a:rPr lang="es-ES_tradnl" smtClean="0"/>
+              <a:rPr lang="es-ES_tradnl"/>
               <a:t>Clic para editar título</a:t>
             </a:r>
             <a:endParaRPr lang="es-ES"/>
@@ -2716,7 +2732,7 @@
           <a:p>
             <a:pPr lvl="0"/>
             <a:r>
-              <a:rPr lang="es-ES_tradnl" smtClean="0"/>
+              <a:rPr lang="es-ES_tradnl"/>
               <a:t>Haga clic para modificar el estilo de texto del patrón</a:t>
             </a:r>
           </a:p>
@@ -2772,35 +2788,35 @@
           <a:p>
             <a:pPr lvl="0"/>
             <a:r>
-              <a:rPr lang="es-ES_tradnl" smtClean="0"/>
+              <a:rPr lang="es-ES_tradnl"/>
               <a:t>Haga clic para modificar el estilo de texto del patrón</a:t>
             </a:r>
           </a:p>
           <a:p>
             <a:pPr lvl="1"/>
             <a:r>
-              <a:rPr lang="es-ES_tradnl" smtClean="0"/>
+              <a:rPr lang="es-ES_tradnl"/>
               <a:t>Segundo nivel</a:t>
             </a:r>
           </a:p>
           <a:p>
             <a:pPr lvl="2"/>
             <a:r>
-              <a:rPr lang="es-ES_tradnl" smtClean="0"/>
+              <a:rPr lang="es-ES_tradnl"/>
               <a:t>Tercer nivel</a:t>
             </a:r>
           </a:p>
           <a:p>
             <a:pPr lvl="3"/>
             <a:r>
-              <a:rPr lang="es-ES_tradnl" smtClean="0"/>
+              <a:rPr lang="es-ES_tradnl"/>
               <a:t>Cuarto nivel</a:t>
             </a:r>
           </a:p>
           <a:p>
             <a:pPr lvl="4"/>
             <a:r>
-              <a:rPr lang="es-ES_tradnl" smtClean="0"/>
+              <a:rPr lang="es-ES_tradnl"/>
               <a:t>Quinto nivel</a:t>
             </a:r>
             <a:endParaRPr lang="es-ES"/>
@@ -2866,7 +2882,7 @@
           <a:p>
             <a:pPr lvl="0"/>
             <a:r>
-              <a:rPr lang="es-ES_tradnl" smtClean="0"/>
+              <a:rPr lang="es-ES_tradnl"/>
               <a:t>Haga clic para modificar el estilo de texto del patrón</a:t>
             </a:r>
           </a:p>
@@ -2922,35 +2938,35 @@
           <a:p>
             <a:pPr lvl="0"/>
             <a:r>
-              <a:rPr lang="es-ES_tradnl" smtClean="0"/>
+              <a:rPr lang="es-ES_tradnl"/>
               <a:t>Haga clic para modificar el estilo de texto del patrón</a:t>
             </a:r>
           </a:p>
           <a:p>
             <a:pPr lvl="1"/>
             <a:r>
-              <a:rPr lang="es-ES_tradnl" smtClean="0"/>
+              <a:rPr lang="es-ES_tradnl"/>
               <a:t>Segundo nivel</a:t>
             </a:r>
           </a:p>
           <a:p>
             <a:pPr lvl="2"/>
             <a:r>
-              <a:rPr lang="es-ES_tradnl" smtClean="0"/>
+              <a:rPr lang="es-ES_tradnl"/>
               <a:t>Tercer nivel</a:t>
             </a:r>
           </a:p>
           <a:p>
             <a:pPr lvl="3"/>
             <a:r>
-              <a:rPr lang="es-ES_tradnl" smtClean="0"/>
+              <a:rPr lang="es-ES_tradnl"/>
               <a:t>Cuarto nivel</a:t>
             </a:r>
           </a:p>
           <a:p>
             <a:pPr lvl="4"/>
             <a:r>
-              <a:rPr lang="es-ES_tradnl" smtClean="0"/>
+              <a:rPr lang="es-ES_tradnl"/>
               <a:t>Quinto nivel</a:t>
             </a:r>
             <a:endParaRPr lang="es-ES"/>
@@ -2983,7 +2999,7 @@
             <a:fld id="{2913CB40-C103-A642-9FFE-7E469F79BBD1}" type="datetimeFigureOut">
               <a:rPr lang="es-ES" smtClean="0"/>
               <a:pPr/>
-              <a:t>02/06/16</a:t>
+              <a:t>12/06/2016</a:t>
             </a:fld>
             <a:endParaRPr lang="es-ES"/>
           </a:p>
@@ -3042,7 +3058,7 @@
             <a:fld id="{DF0D5ED5-5AB1-0148-B4D4-4EA695B82FB8}" type="slidenum">
               <a:rPr lang="es-ES" smtClean="0"/>
               <a:pPr/>
-              <a:t>‹Nr.›</a:t>
+              <a:t>‹Nº›</a:t>
             </a:fld>
             <a:endParaRPr lang="es-ES"/>
           </a:p>
@@ -3094,7 +3110,7 @@
           <a:lstStyle/>
           <a:p>
             <a:r>
-              <a:rPr lang="es-ES_tradnl" smtClean="0"/>
+              <a:rPr lang="es-ES_tradnl"/>
               <a:t>Clic para editar título</a:t>
             </a:r>
             <a:endParaRPr lang="es-ES"/>
@@ -3127,7 +3143,7 @@
             <a:fld id="{2913CB40-C103-A642-9FFE-7E469F79BBD1}" type="datetimeFigureOut">
               <a:rPr lang="es-ES" smtClean="0"/>
               <a:pPr/>
-              <a:t>02/06/16</a:t>
+              <a:t>12/06/2016</a:t>
             </a:fld>
             <a:endParaRPr lang="es-ES"/>
           </a:p>
@@ -3186,7 +3202,7 @@
             <a:fld id="{DF0D5ED5-5AB1-0148-B4D4-4EA695B82FB8}" type="slidenum">
               <a:rPr lang="es-ES" smtClean="0"/>
               <a:pPr/>
-              <a:t>‹Nr.›</a:t>
+              <a:t>‹Nº›</a:t>
             </a:fld>
             <a:endParaRPr lang="es-ES"/>
           </a:p>
@@ -3248,7 +3264,7 @@
             <a:fld id="{2913CB40-C103-A642-9FFE-7E469F79BBD1}" type="datetimeFigureOut">
               <a:rPr lang="es-ES" smtClean="0"/>
               <a:pPr/>
-              <a:t>02/06/16</a:t>
+              <a:t>12/06/2016</a:t>
             </a:fld>
             <a:endParaRPr lang="es-ES"/>
           </a:p>
@@ -3307,7 +3323,7 @@
             <a:fld id="{DF0D5ED5-5AB1-0148-B4D4-4EA695B82FB8}" type="slidenum">
               <a:rPr lang="es-ES" smtClean="0"/>
               <a:pPr/>
-              <a:t>‹Nr.›</a:t>
+              <a:t>‹Nº›</a:t>
             </a:fld>
             <a:endParaRPr lang="es-ES"/>
           </a:p>
@@ -3368,7 +3384,7 @@
           </a:lstStyle>
           <a:p>
             <a:r>
-              <a:rPr lang="es-ES_tradnl" smtClean="0"/>
+              <a:rPr lang="es-ES_tradnl"/>
               <a:t>Clic para editar título</a:t>
             </a:r>
             <a:endParaRPr lang="es-ES"/>
@@ -3425,35 +3441,35 @@
           <a:p>
             <a:pPr lvl="0"/>
             <a:r>
-              <a:rPr lang="es-ES_tradnl" smtClean="0"/>
+              <a:rPr lang="es-ES_tradnl"/>
               <a:t>Haga clic para modificar el estilo de texto del patrón</a:t>
             </a:r>
           </a:p>
           <a:p>
             <a:pPr lvl="1"/>
             <a:r>
-              <a:rPr lang="es-ES_tradnl" smtClean="0"/>
+              <a:rPr lang="es-ES_tradnl"/>
               <a:t>Segundo nivel</a:t>
             </a:r>
           </a:p>
           <a:p>
             <a:pPr lvl="2"/>
             <a:r>
-              <a:rPr lang="es-ES_tradnl" smtClean="0"/>
+              <a:rPr lang="es-ES_tradnl"/>
               <a:t>Tercer nivel</a:t>
             </a:r>
           </a:p>
           <a:p>
             <a:pPr lvl="3"/>
             <a:r>
-              <a:rPr lang="es-ES_tradnl" smtClean="0"/>
+              <a:rPr lang="es-ES_tradnl"/>
               <a:t>Cuarto nivel</a:t>
             </a:r>
           </a:p>
           <a:p>
             <a:pPr lvl="4"/>
             <a:r>
-              <a:rPr lang="es-ES_tradnl" smtClean="0"/>
+              <a:rPr lang="es-ES_tradnl"/>
               <a:t>Quinto nivel</a:t>
             </a:r>
             <a:endParaRPr lang="es-ES"/>
@@ -3519,7 +3535,7 @@
           <a:p>
             <a:pPr lvl="0"/>
             <a:r>
-              <a:rPr lang="es-ES_tradnl" smtClean="0"/>
+              <a:rPr lang="es-ES_tradnl"/>
               <a:t>Haga clic para modificar el estilo de texto del patrón</a:t>
             </a:r>
           </a:p>
@@ -3551,7 +3567,7 @@
             <a:fld id="{2913CB40-C103-A642-9FFE-7E469F79BBD1}" type="datetimeFigureOut">
               <a:rPr lang="es-ES" smtClean="0"/>
               <a:pPr/>
-              <a:t>02/06/16</a:t>
+              <a:t>12/06/2016</a:t>
             </a:fld>
             <a:endParaRPr lang="es-ES"/>
           </a:p>
@@ -3610,7 +3626,7 @@
             <a:fld id="{DF0D5ED5-5AB1-0148-B4D4-4EA695B82FB8}" type="slidenum">
               <a:rPr lang="es-ES" smtClean="0"/>
               <a:pPr/>
-              <a:t>‹Nr.›</a:t>
+              <a:t>‹Nº›</a:t>
             </a:fld>
             <a:endParaRPr lang="es-ES"/>
           </a:p>
@@ -3671,7 +3687,7 @@
           </a:lstStyle>
           <a:p>
             <a:r>
-              <a:rPr lang="es-ES_tradnl" smtClean="0"/>
+              <a:rPr lang="es-ES_tradnl"/>
               <a:t>Clic para editar título</a:t>
             </a:r>
             <a:endParaRPr lang="es-ES"/>
@@ -3798,7 +3814,7 @@
           <a:p>
             <a:pPr lvl="0"/>
             <a:r>
-              <a:rPr lang="es-ES_tradnl" smtClean="0"/>
+              <a:rPr lang="es-ES_tradnl"/>
               <a:t>Haga clic para modificar el estilo de texto del patrón</a:t>
             </a:r>
           </a:p>
@@ -3830,7 +3846,7 @@
             <a:fld id="{2913CB40-C103-A642-9FFE-7E469F79BBD1}" type="datetimeFigureOut">
               <a:rPr lang="es-ES" smtClean="0"/>
               <a:pPr/>
-              <a:t>02/06/16</a:t>
+              <a:t>12/06/2016</a:t>
             </a:fld>
             <a:endParaRPr lang="es-ES"/>
           </a:p>
@@ -3889,7 +3905,7 @@
             <a:fld id="{DF0D5ED5-5AB1-0148-B4D4-4EA695B82FB8}" type="slidenum">
               <a:rPr lang="es-ES" smtClean="0"/>
               <a:pPr/>
-              <a:t>‹Nr.›</a:t>
+              <a:t>‹Nº›</a:t>
             </a:fld>
             <a:endParaRPr lang="es-ES"/>
           </a:p>
@@ -3959,7 +3975,7 @@
           <a:lstStyle/>
           <a:p>
             <a:r>
-              <a:rPr lang="es-ES_tradnl" smtClean="0"/>
+              <a:rPr lang="es-ES_tradnl"/>
               <a:t>Clic para editar título</a:t>
             </a:r>
             <a:endParaRPr lang="es-ES"/>
@@ -3993,35 +4009,35 @@
           <a:p>
             <a:pPr lvl="0"/>
             <a:r>
-              <a:rPr lang="es-ES_tradnl" dirty="0" smtClean="0"/>
+              <a:rPr lang="es-ES_tradnl" dirty="0"/>
               <a:t>Haga clic para modificar el estilo de texto del patrón</a:t>
             </a:r>
           </a:p>
           <a:p>
             <a:pPr lvl="1"/>
             <a:r>
-              <a:rPr lang="es-ES_tradnl" dirty="0" smtClean="0"/>
+              <a:rPr lang="es-ES_tradnl" dirty="0"/>
               <a:t>Segundo nivel</a:t>
             </a:r>
           </a:p>
           <a:p>
             <a:pPr lvl="2"/>
             <a:r>
-              <a:rPr lang="es-ES_tradnl" dirty="0" smtClean="0"/>
+              <a:rPr lang="es-ES_tradnl" dirty="0"/>
               <a:t>Tercer nivel</a:t>
             </a:r>
           </a:p>
           <a:p>
             <a:pPr lvl="3"/>
             <a:r>
-              <a:rPr lang="es-ES_tradnl" dirty="0" smtClean="0"/>
+              <a:rPr lang="es-ES_tradnl" dirty="0"/>
               <a:t>Cuarto nivel</a:t>
             </a:r>
           </a:p>
           <a:p>
             <a:pPr lvl="4"/>
             <a:r>
-              <a:rPr lang="es-ES_tradnl" dirty="0" smtClean="0"/>
+              <a:rPr lang="es-ES_tradnl" dirty="0"/>
               <a:t>Quinto nivel</a:t>
             </a:r>
             <a:endParaRPr lang="es-ES" dirty="0"/>
@@ -4145,7 +4161,7 @@
           <a:p>
             <a:pPr algn="ctr"/>
             <a:r>
-              <a:rPr lang="es-ES" sz="1500" dirty="0" smtClean="0">
+              <a:rPr lang="es-ES" sz="1500" dirty="0">
                 <a:solidFill>
                   <a:srgbClr val="008000"/>
                 </a:solidFill>
@@ -4153,20 +4169,12 @@
               <a:t>PROYECTOS</a:t>
             </a:r>
             <a:r>
-              <a:rPr lang="es-ES" sz="1500" baseline="0" dirty="0" smtClean="0">
+              <a:rPr lang="es-ES" sz="1500" baseline="0" dirty="0">
                 <a:solidFill>
                   <a:srgbClr val="008000"/>
                 </a:solidFill>
               </a:rPr>
-              <a:t> I + D </a:t>
-            </a:r>
-            <a:r>
-              <a:rPr lang="es-ES" sz="1500" baseline="0" dirty="0" smtClean="0">
-                <a:solidFill>
-                  <a:srgbClr val="008000"/>
-                </a:solidFill>
-              </a:rPr>
-              <a:t>II</a:t>
+              <a:t> I + D II</a:t>
             </a:r>
             <a:endParaRPr lang="es-ES" sz="1500" dirty="0">
               <a:solidFill>
@@ -4334,7 +4342,7 @@
                 </a:solidFill>
               </a:rPr>
               <a:pPr algn="r"/>
-              <a:t>‹Nr.›</a:t>
+              <a:t>‹Nº›</a:t>
             </a:fld>
             <a:endParaRPr lang="es-ES" sz="1500" b="1" dirty="0">
               <a:solidFill>
@@ -4793,15 +4801,7 @@
                   <a:srgbClr val="007D00"/>
                 </a:solidFill>
               </a:rPr>
-              <a:t>-</a:t>
-            </a:r>
-            <a:r>
-              <a:rPr lang="es-ES_tradnl" sz="8000" b="1" dirty="0" smtClean="0">
-                <a:solidFill>
-                  <a:srgbClr val="007D00"/>
-                </a:solidFill>
-              </a:rPr>
-              <a:t>PT</a:t>
+              <a:t>-PT</a:t>
             </a:r>
             <a:endParaRPr lang="es-ES_tradnl" sz="8000" dirty="0">
               <a:solidFill>
@@ -4811,7 +4811,7 @@
           </a:p>
           <a:p>
             <a:r>
-              <a:rPr lang="es-MX" b="1" dirty="0" smtClean="0">
+              <a:rPr lang="es-MX" b="1" dirty="0">
                 <a:ln w="13462">
                   <a:solidFill>
                     <a:schemeClr val="bg1"/>
@@ -5000,7 +5000,7 @@
               <a:buNone/>
             </a:pPr>
             <a:r>
-              <a:rPr lang="es-MX" sz="2400" b="1" dirty="0" smtClean="0"/>
+              <a:rPr lang="es-MX" sz="2400" b="1" dirty="0"/>
               <a:t>Integrantes del equipo:</a:t>
             </a:r>
           </a:p>
@@ -5008,7 +5008,7 @@
             <a:pPr marL="0" indent="0" algn="r">
               <a:buNone/>
             </a:pPr>
-            <a:endParaRPr lang="es-MX" sz="2000" dirty="0" smtClean="0"/>
+            <a:endParaRPr lang="es-MX" sz="2000" dirty="0"/>
           </a:p>
           <a:p>
             <a:pPr marL="0" indent="0" algn="just">
@@ -5018,7 +5018,7 @@
               <a:buNone/>
             </a:pPr>
             <a:r>
-              <a:rPr lang="es-MX" sz="2200" dirty="0" smtClean="0"/>
+              <a:rPr lang="es-MX" sz="2200" dirty="0"/>
               <a:t>González Moreno Karina</a:t>
             </a:r>
           </a:p>
@@ -5030,7 +5030,7 @@
               <a:buNone/>
             </a:pPr>
             <a:r>
-              <a:rPr lang="es-MX" sz="2200" dirty="0" smtClean="0"/>
+              <a:rPr lang="es-MX" sz="2200" dirty="0"/>
               <a:t>Lozano Sánchez Iván</a:t>
             </a:r>
           </a:p>
@@ -5059,7 +5059,7 @@
           <a:p>
             <a:pPr algn="ctr"/>
             <a:r>
-              <a:rPr lang="es-MX" sz="2500" b="1" dirty="0" smtClean="0">
+              <a:rPr lang="es-MX" sz="2500" b="1" dirty="0">
                 <a:ln w="13462">
                   <a:solidFill>
                     <a:schemeClr val="bg1"/>
@@ -5117,21 +5117,6 @@
   <p:clrMapOvr>
     <a:masterClrMapping/>
   </p:clrMapOvr>
-  <mc:AlternateContent xmlns:mc="http://schemas.openxmlformats.org/markup-compatibility/2006" xmlns:p14="http://schemas.microsoft.com/office/powerpoint/2010/main">
-    <mc:Choice Requires="p14">
-      <p:transition p14:dur="0"/>
-    </mc:Choice>
-    <mc:Fallback xmlns="">
-      <p:transition/>
-    </mc:Fallback>
-  </mc:AlternateContent>
-  <p:timing>
-    <p:tnLst>
-      <p:par>
-        <p:cTn xmlns:p14="http://schemas.microsoft.com/office/powerpoint/2010/main" id="1" dur="indefinite" restart="never" nodeType="tmRoot"/>
-      </p:par>
-    </p:tnLst>
-  </p:timing>
 </p:sld>
 </file>
 
@@ -5178,7 +5163,7 @@
                 <a:spcPct val="110000"/>
               </a:lnSpc>
             </a:pPr>
-            <a:endParaRPr lang="es-ES_tradnl" sz="2000" dirty="0" smtClean="0">
+            <a:endParaRPr lang="es-ES_tradnl" sz="2000" dirty="0">
               <a:latin typeface="Cambria"/>
               <a:cs typeface="Cambria"/>
             </a:endParaRPr>
@@ -5190,18 +5175,11 @@
               </a:lnSpc>
             </a:pPr>
             <a:r>
-              <a:rPr lang="es-ES_tradnl" sz="2000" dirty="0" smtClean="0">
-                <a:latin typeface="Cambria"/>
-                <a:cs typeface="Cambria"/>
-              </a:rPr>
-              <a:t>Desarrollar </a:t>
-            </a:r>
-            <a:r>
               <a:rPr lang="es-ES_tradnl" sz="2000" dirty="0">
                 <a:latin typeface="Cambria"/>
                 <a:cs typeface="Cambria"/>
               </a:rPr>
-              <a:t>la aplicación no requiere de ingresos al inicio ya que se trabajará de forma gratuita pero si la aplicación resulta funcional y todo un éxito, se pretende subirla al Apple </a:t>
+              <a:t>Desarrollar la aplicación no requiere de ingresos al inicio ya que se trabajará de forma gratuita pero si la aplicación resulta funcional y todo un éxito, se pretende subirla al Apple </a:t>
             </a:r>
             <a:r>
               <a:rPr lang="es-ES_tradnl" sz="2000" dirty="0" err="1">
@@ -5257,7 +5235,7 @@
           <a:p>
             <a:pPr algn="r"/>
             <a:r>
-              <a:rPr lang="es-ES_tradnl" sz="3800" dirty="0" smtClean="0">
+              <a:rPr lang="es-ES_tradnl" sz="3800" dirty="0">
                 <a:solidFill>
                   <a:srgbClr val="007D00"/>
                 </a:solidFill>
@@ -5285,13 +5263,6 @@
   <p:clrMapOvr>
     <a:masterClrMapping/>
   </p:clrMapOvr>
-  <p:timing>
-    <p:tnLst>
-      <p:par>
-        <p:cTn xmlns:p14="http://schemas.microsoft.com/office/powerpoint/2010/main" id="1" dur="indefinite" restart="never" nodeType="tmRoot"/>
-      </p:par>
-    </p:tnLst>
-  </p:timing>
 </p:sld>
 </file>
 
@@ -5442,18 +5413,13 @@
           <a:p>
             <a:pPr algn="r"/>
             <a:r>
-              <a:rPr lang="es-ES_tradnl" sz="3800" dirty="0" smtClean="0">
+              <a:rPr lang="es-ES_tradnl" sz="3800" dirty="0">
                 <a:solidFill>
                   <a:srgbClr val="007D00"/>
                 </a:solidFill>
               </a:rPr>
               <a:t>Tiempo</a:t>
             </a:r>
-            <a:endParaRPr lang="es-ES_tradnl" sz="3800" dirty="0">
-              <a:solidFill>
-                <a:srgbClr val="007D00"/>
-              </a:solidFill>
-            </a:endParaRPr>
           </a:p>
         </p:txBody>
       </p:sp>
@@ -5483,7 +5449,7 @@
                 <a:spcPct val="110000"/>
               </a:lnSpc>
             </a:pPr>
-            <a:endParaRPr lang="es-ES_tradnl" sz="2000" dirty="0" smtClean="0"/>
+            <a:endParaRPr lang="es-ES_tradnl" sz="2000" dirty="0"/>
           </a:p>
           <a:p>
             <a:pPr algn="just">
@@ -5492,25 +5458,18 @@
               </a:lnSpc>
             </a:pPr>
             <a:r>
-              <a:rPr lang="es-ES_tradnl" sz="2000" dirty="0" smtClean="0">
-                <a:latin typeface="Cambria"/>
-                <a:cs typeface="Cambria"/>
-              </a:rPr>
-              <a:t>Este </a:t>
-            </a:r>
-            <a:r>
               <a:rPr lang="es-ES_tradnl" sz="2000" dirty="0">
                 <a:latin typeface="Cambria"/>
                 <a:cs typeface="Cambria"/>
               </a:rPr>
-              <a:t>proyecto se entregará en fecha establecida (24 de junio del presente año) y los emprendedores son: Karina González e Iván Lozano como programadores, la experiencia es medianamente y se reforzará durante el desarrollo de la aplicación.</a:t>
+              <a:t>Este proyecto se entregará en fecha establecida (24 de junio del presente año) y los emprendedores son: Karina González e Iván Lozano como programadores, la experiencia es medianamente y se reforzará durante el desarrollo de la aplicación.</a:t>
             </a:r>
           </a:p>
           <a:p>
             <a:endParaRPr lang="es-ES" sz="1600" dirty="0"/>
           </a:p>
           <a:p>
-            <a:endParaRPr lang="es-ES_tradnl" sz="1600" dirty="0" smtClean="0"/>
+            <a:endParaRPr lang="es-ES_tradnl" sz="1600" dirty="0"/>
           </a:p>
           <a:p>
             <a:endParaRPr lang="es-ES_tradnl" sz="1600" dirty="0"/>
@@ -5554,13 +5513,6 @@
   <p:clrMapOvr>
     <a:masterClrMapping/>
   </p:clrMapOvr>
-  <p:timing>
-    <p:tnLst>
-      <p:par>
-        <p:cTn xmlns:p14="http://schemas.microsoft.com/office/powerpoint/2010/main" id="1" dur="indefinite" restart="never" nodeType="tmRoot"/>
-      </p:par>
-    </p:tnLst>
-  </p:timing>
 </p:sld>
 </file>
 
@@ -5604,18 +5556,13 @@
           <a:p>
             <a:pPr algn="r"/>
             <a:r>
-              <a:rPr lang="es-ES_tradnl" sz="3800" dirty="0" smtClean="0">
+              <a:rPr lang="es-ES_tradnl" sz="3800" dirty="0">
                 <a:solidFill>
                   <a:srgbClr val="007D00"/>
                 </a:solidFill>
               </a:rPr>
               <a:t>Referencias</a:t>
             </a:r>
-            <a:endParaRPr lang="es-ES_tradnl" sz="3800" dirty="0">
-              <a:solidFill>
-                <a:srgbClr val="007D00"/>
-              </a:solidFill>
-            </a:endParaRPr>
           </a:p>
         </p:txBody>
       </p:sp>
@@ -5693,7 +5640,7 @@
               <a:rPr lang="de-DE" sz="2000" dirty="0" err="1"/>
               <a:t>nios</a:t>
             </a:r>
-            <a:endParaRPr lang="es-ES_tradnl" sz="1600" dirty="0" smtClean="0"/>
+            <a:endParaRPr lang="es-ES_tradnl" sz="1600" dirty="0"/>
           </a:p>
           <a:p>
             <a:endParaRPr lang="es-ES_tradnl" sz="1600" dirty="0"/>
@@ -5713,13 +5660,6 @@
   <p:clrMapOvr>
     <a:masterClrMapping/>
   </p:clrMapOvr>
-  <p:timing>
-    <p:tnLst>
-      <p:par>
-        <p:cTn xmlns:p14="http://schemas.microsoft.com/office/powerpoint/2010/main" id="1" dur="indefinite" restart="never" nodeType="tmRoot"/>
-      </p:par>
-    </p:tnLst>
-  </p:timing>
 </p:sld>
 </file>
 
@@ -5777,7 +5717,7 @@
           </a:lstStyle>
           <a:p>
             <a:r>
-              <a:rPr lang="es-ES_tradnl" sz="6000" b="1" dirty="0" err="1" smtClean="0">
+              <a:rPr lang="es-ES_tradnl" sz="6000" b="1" dirty="0" err="1">
                 <a:solidFill>
                   <a:srgbClr val="007D00"/>
                 </a:solidFill>
@@ -5790,15 +5730,7 @@
                   <a:srgbClr val="007D00"/>
                 </a:solidFill>
               </a:rPr>
-              <a:t>-</a:t>
-            </a:r>
-            <a:r>
-              <a:rPr lang="es-ES_tradnl" sz="6000" b="1" dirty="0" smtClean="0">
-                <a:solidFill>
-                  <a:srgbClr val="007D00"/>
-                </a:solidFill>
-              </a:rPr>
-              <a:t>PT</a:t>
+              <a:t>-PT</a:t>
             </a:r>
             <a:endParaRPr lang="es-ES_tradnl" sz="6000" dirty="0">
               <a:solidFill>
@@ -5935,11 +5867,7 @@
             <a:pPr algn="ctr"/>
             <a:r>
               <a:rPr lang="es-ES_tradnl" b="1" dirty="0"/>
-              <a:t>Aplicación que permite al usuario aprender la tabla periódica de forma </a:t>
-            </a:r>
-            <a:r>
-              <a:rPr lang="es-ES_tradnl" b="1" dirty="0" smtClean="0"/>
-              <a:t>entretenida</a:t>
+              <a:t>Aplicación que permite al usuario aprender la tabla periódica de forma entretenida</a:t>
             </a:r>
             <a:endParaRPr lang="es-ES_tradnl" dirty="0"/>
           </a:p>
@@ -5961,14 +5889,14 @@
           </a:p>
           <a:p>
             <a:pPr algn="just"/>
-            <a:endParaRPr lang="es-ES_tradnl" sz="2000" dirty="0" smtClean="0"/>
+            <a:endParaRPr lang="es-ES_tradnl" sz="2000" dirty="0"/>
           </a:p>
           <a:p>
             <a:pPr algn="just"/>
-            <a:endParaRPr lang="es-ES" sz="2000" dirty="0" smtClean="0"/>
-          </a:p>
-          <a:p>
-            <a:endParaRPr lang="es-ES_tradnl" sz="2000" dirty="0" smtClean="0"/>
+            <a:endParaRPr lang="es-ES" sz="2000" dirty="0"/>
+          </a:p>
+          <a:p>
+            <a:endParaRPr lang="es-ES_tradnl" sz="2000" dirty="0"/>
           </a:p>
         </p:txBody>
       </p:sp>
@@ -5982,16 +5910,9 @@
   <p:clrMapOvr>
     <a:masterClrMapping/>
   </p:clrMapOvr>
-  <p:transition xmlns:p14="http://schemas.microsoft.com/office/powerpoint/2010/main" spd="slow">
+  <p:transition spd="slow">
     <p:push dir="u"/>
   </p:transition>
-  <p:timing>
-    <p:tnLst>
-      <p:par>
-        <p:cTn xmlns:p14="http://schemas.microsoft.com/office/powerpoint/2010/main" id="1" dur="indefinite" restart="never" nodeType="tmRoot"/>
-      </p:par>
-    </p:tnLst>
-  </p:timing>
 </p:sld>
 </file>
 
@@ -6057,14 +5978,6 @@
           </a:p>
           <a:p>
             <a:pPr algn="r"/>
-            <a:r>
-              <a:rPr lang="ro-RO" dirty="0">
-                <a:solidFill>
-                  <a:srgbClr val="007D00"/>
-                </a:solidFill>
-              </a:rPr>
-              <a:t/>
-            </a:r>
             <a:br>
               <a:rPr lang="ro-RO" dirty="0">
                 <a:solidFill>
@@ -6198,7 +6111,7 @@
           </a:lstStyle>
           <a:p>
             <a:pPr algn="just"/>
-            <a:endParaRPr lang="es-ES_tradnl" sz="2000" dirty="0" smtClean="0"/>
+            <a:endParaRPr lang="es-ES_tradnl" sz="2000" dirty="0"/>
           </a:p>
           <a:p>
             <a:pPr algn="just"/>
@@ -6211,29 +6124,8 @@
             <a:pPr algn="just"/>
             <a:r>
               <a:rPr lang="es-ES_tradnl" sz="2000" dirty="0"/>
-              <a:t>Esto es un problema que se ha detectado en </a:t>
-            </a:r>
-            <a:r>
-              <a:rPr lang="es-ES_tradnl" sz="2000" dirty="0" smtClean="0"/>
-              <a:t>ellos, </a:t>
-            </a:r>
-            <a:r>
-              <a:rPr lang="es-ES_tradnl" sz="2000" dirty="0"/>
-              <a:t>puesto que les cuesta retener toda la </a:t>
-            </a:r>
-            <a:r>
-              <a:rPr lang="es-ES_tradnl" sz="2000" dirty="0" smtClean="0"/>
-              <a:t>información y de esto se deriva el </a:t>
-            </a:r>
-            <a:r>
-              <a:rPr lang="es-ES_tradnl" sz="2000" dirty="0"/>
-              <a:t>del bajo rendimiento académico </a:t>
-            </a:r>
-            <a:r>
-              <a:rPr lang="es-ES_tradnl" sz="2000" dirty="0" smtClean="0"/>
-              <a:t>. </a:t>
-            </a:r>
-            <a:endParaRPr lang="es-ES_tradnl" sz="2000" dirty="0" smtClean="0"/>
+              <a:t>Esto es un problema que se ha detectado en ellos, puesto que les cuesta retener toda la información y de esto se deriva el del bajo rendimiento académico . </a:t>
+            </a:r>
           </a:p>
         </p:txBody>
       </p:sp>
@@ -6260,134 +6152,16 @@
           <a:p>
             <a:pPr algn="r"/>
             <a:r>
-              <a:rPr lang="es-ES_tradnl" sz="3800" dirty="0" smtClean="0">
+              <a:rPr lang="es-ES_tradnl" sz="3800" dirty="0">
                 <a:solidFill>
                   <a:srgbClr val="007D00"/>
                 </a:solidFill>
               </a:rPr>
-              <a:t>Problem</a:t>
-            </a:r>
-            <a:r>
-              <a:rPr lang="es-ES_tradnl" sz="3800" dirty="0" smtClean="0">
-                <a:solidFill>
-                  <a:srgbClr val="007D00"/>
-                </a:solidFill>
-              </a:rPr>
-              <a:t>ática</a:t>
-            </a:r>
-            <a:endParaRPr lang="es-ES_tradnl" sz="3800" dirty="0">
-              <a:solidFill>
-                <a:srgbClr val="007D00"/>
-              </a:solidFill>
-            </a:endParaRPr>
-          </a:p>
-        </p:txBody>
-      </p:sp>
-      <p:pic>
-        <p:nvPicPr>
-          <p:cNvPr id="6" name="Imagen 5"/>
-          <p:cNvPicPr>
-            <a:picLocks noChangeAspect="1"/>
-          </p:cNvPicPr>
-          <p:nvPr/>
-        </p:nvPicPr>
-        <p:blipFill>
-          <a:blip r:embed="rId3">
-            <a:clrChange>
-              <a:clrFrom>
-                <a:srgbClr val="FEFEFE"/>
-              </a:clrFrom>
-              <a:clrTo>
-                <a:srgbClr val="FEFEFE">
-                  <a:alpha val="0"/>
-                </a:srgbClr>
-              </a:clrTo>
-            </a:clrChange>
-          </a:blip>
-          <a:stretch>
-            <a:fillRect/>
-          </a:stretch>
-        </p:blipFill>
-        <p:spPr>
-          <a:xfrm>
-            <a:off x="1821281" y="5351300"/>
-            <a:ext cx="1744292" cy="1301242"/>
-          </a:xfrm>
-          <a:prstGeom prst="rect">
-            <a:avLst/>
-          </a:prstGeom>
-        </p:spPr>
-      </p:pic>
-      <p:pic>
-        <p:nvPicPr>
-          <p:cNvPr id="7" name="Imagen 6"/>
-          <p:cNvPicPr>
-            <a:picLocks noChangeAspect="1"/>
-          </p:cNvPicPr>
-          <p:nvPr/>
-        </p:nvPicPr>
-        <p:blipFill>
-          <a:blip r:embed="rId4">
-            <a:clrChange>
-              <a:clrFrom>
-                <a:srgbClr val="FFFFFF"/>
-              </a:clrFrom>
-              <a:clrTo>
-                <a:srgbClr val="FFFFFF">
-                  <a:alpha val="0"/>
-                </a:srgbClr>
-              </a:clrTo>
-            </a:clrChange>
-          </a:blip>
-          <a:stretch>
-            <a:fillRect/>
-          </a:stretch>
-        </p:blipFill>
-        <p:spPr>
-          <a:xfrm>
-            <a:off x="5146372" y="4680936"/>
-            <a:ext cx="1954952" cy="1067835"/>
-          </a:xfrm>
-          <a:prstGeom prst="rect">
-            <a:avLst/>
-          </a:prstGeom>
-        </p:spPr>
-      </p:pic>
-      <p:pic>
-        <p:nvPicPr>
-          <p:cNvPr id="8" name="Imagen 7"/>
-          <p:cNvPicPr>
-            <a:picLocks noChangeAspect="1"/>
-          </p:cNvPicPr>
-          <p:nvPr/>
-        </p:nvPicPr>
-        <p:blipFill>
-          <a:blip r:embed="rId5">
-            <a:clrChange>
-              <a:clrFrom>
-                <a:srgbClr val="FAFBFE"/>
-              </a:clrFrom>
-              <a:clrTo>
-                <a:srgbClr val="FAFBFE">
-                  <a:alpha val="0"/>
-                </a:srgbClr>
-              </a:clrTo>
-            </a:clrChange>
-          </a:blip>
-          <a:stretch>
-            <a:fillRect/>
-          </a:stretch>
-        </p:blipFill>
-        <p:spPr>
-          <a:xfrm>
-            <a:off x="3630684" y="4536943"/>
-            <a:ext cx="1515688" cy="1515688"/>
-          </a:xfrm>
-          <a:prstGeom prst="rect">
-            <a:avLst/>
-          </a:prstGeom>
-        </p:spPr>
-      </p:pic>
+              <a:t>Problemática</a:t>
+            </a:r>
+          </a:p>
+        </p:txBody>
+      </p:sp>
     </p:spTree>
     <p:extLst>
       <p:ext uri="{BB962C8B-B14F-4D97-AF65-F5344CB8AC3E}">
@@ -6398,16 +6172,9 @@
   <p:clrMapOvr>
     <a:masterClrMapping/>
   </p:clrMapOvr>
-  <p:transition xmlns:p14="http://schemas.microsoft.com/office/powerpoint/2010/main" spd="slow">
+  <p:transition spd="slow">
     <p:push dir="u"/>
   </p:transition>
-  <p:timing>
-    <p:tnLst>
-      <p:par>
-        <p:cTn xmlns:p14="http://schemas.microsoft.com/office/powerpoint/2010/main" id="1" dur="indefinite" restart="never" nodeType="tmRoot"/>
-      </p:par>
-    </p:tnLst>
-  </p:timing>
 </p:sld>
 </file>
 
@@ -6473,14 +6240,6 @@
           </a:p>
           <a:p>
             <a:pPr algn="r"/>
-            <a:r>
-              <a:rPr lang="ro-RO" dirty="0">
-                <a:solidFill>
-                  <a:srgbClr val="007D00"/>
-                </a:solidFill>
-              </a:rPr>
-              <a:t/>
-            </a:r>
             <a:br>
               <a:rPr lang="ro-RO" dirty="0">
                 <a:solidFill>
@@ -6617,7 +6376,7 @@
               <a:buFont typeface="Wingdings" charset="2"/>
               <a:buChar char="ü"/>
             </a:pPr>
-            <a:endParaRPr lang="es-ES_tradnl" sz="2000" dirty="0" smtClean="0"/>
+            <a:endParaRPr lang="es-ES_tradnl" sz="2000" dirty="0"/>
           </a:p>
           <a:p>
             <a:pPr marL="342900" indent="-342900" algn="just">
@@ -6628,16 +6387,12 @@
               <a:buChar char="ü"/>
             </a:pPr>
             <a:r>
-              <a:rPr lang="es-ES_tradnl" sz="2000" dirty="0" smtClean="0">
+              <a:rPr lang="es-ES_tradnl" sz="2000" dirty="0">
                 <a:latin typeface="Cambria"/>
                 <a:cs typeface="Cambria"/>
               </a:rPr>
               <a:t>BLA BLA BLA </a:t>
             </a:r>
-            <a:endParaRPr lang="es-ES_tradnl" sz="2000" dirty="0">
-              <a:latin typeface="Cambria"/>
-              <a:cs typeface="Cambria"/>
-            </a:endParaRPr>
           </a:p>
           <a:p>
             <a:pPr marL="342900" indent="-342900" algn="just">
@@ -6652,7 +6407,7 @@
           </a:p>
           <a:p>
             <a:pPr algn="just"/>
-            <a:endParaRPr lang="es-ES_tradnl" sz="2000" dirty="0" smtClean="0"/>
+            <a:endParaRPr lang="es-ES_tradnl" sz="2000" dirty="0"/>
           </a:p>
         </p:txBody>
       </p:sp>
@@ -6679,26 +6434,13 @@
           <a:p>
             <a:pPr algn="r"/>
             <a:r>
-              <a:rPr lang="es-ES_tradnl" sz="3800" dirty="0" smtClean="0">
+              <a:rPr lang="es-ES_tradnl" sz="3800" dirty="0">
                 <a:solidFill>
                   <a:srgbClr val="007D00"/>
                 </a:solidFill>
               </a:rPr>
-              <a:t>Justificaci</a:t>
-            </a:r>
-            <a:r>
-              <a:rPr lang="es-ES_tradnl" sz="3800" dirty="0" smtClean="0">
-                <a:solidFill>
-                  <a:srgbClr val="007D00"/>
-                </a:solidFill>
-              </a:rPr>
-              <a:t>ón</a:t>
-            </a:r>
-            <a:endParaRPr lang="es-ES_tradnl" sz="3800" dirty="0">
-              <a:solidFill>
-                <a:srgbClr val="007D00"/>
-              </a:solidFill>
-            </a:endParaRPr>
+              <a:t>Justificación</a:t>
+            </a:r>
           </a:p>
         </p:txBody>
       </p:sp>
@@ -6712,16 +6454,9 @@
   <p:clrMapOvr>
     <a:masterClrMapping/>
   </p:clrMapOvr>
-  <p:transition xmlns:p14="http://schemas.microsoft.com/office/powerpoint/2010/main" spd="slow">
+  <p:transition spd="slow">
     <p:push dir="u"/>
   </p:transition>
-  <p:timing>
-    <p:tnLst>
-      <p:par>
-        <p:cTn xmlns:p14="http://schemas.microsoft.com/office/powerpoint/2010/main" id="1" dur="indefinite" restart="never" nodeType="tmRoot"/>
-      </p:par>
-    </p:tnLst>
-  </p:timing>
 </p:sld>
 </file>
 
@@ -6787,14 +6522,6 @@
           </a:p>
           <a:p>
             <a:pPr algn="r"/>
-            <a:r>
-              <a:rPr lang="ro-RO" dirty="0">
-                <a:solidFill>
-                  <a:srgbClr val="007D00"/>
-                </a:solidFill>
-              </a:rPr>
-              <a:t/>
-            </a:r>
             <a:br>
               <a:rPr lang="ro-RO" dirty="0">
                 <a:solidFill>
@@ -6943,41 +6670,9 @@
           <a:p>
             <a:r>
               <a:rPr lang="es-ES" sz="2000" dirty="0"/>
-              <a:t>Pero en particular, </a:t>
-            </a:r>
-            <a:r>
-              <a:rPr lang="es-ES" sz="2000" dirty="0" smtClean="0"/>
-              <a:t>ésta </a:t>
-            </a:r>
-            <a:r>
-              <a:rPr lang="es-ES" sz="2000" dirty="0"/>
-              <a:t>aplicación </a:t>
-            </a:r>
-            <a:r>
-              <a:rPr lang="es-ES" sz="2000" dirty="0" smtClean="0"/>
-              <a:t>pretende obtener una forma </a:t>
-            </a:r>
-            <a:r>
-              <a:rPr lang="es-ES" sz="2000" dirty="0"/>
-              <a:t>diferente y efectiva de </a:t>
-            </a:r>
-            <a:r>
-              <a:rPr lang="es-ES" sz="2000" dirty="0" smtClean="0"/>
-              <a:t>aprender y </a:t>
-            </a:r>
-            <a:r>
-              <a:rPr lang="es-ES" sz="2000" dirty="0"/>
-              <a:t>cumplirá con su </a:t>
-            </a:r>
-            <a:r>
-              <a:rPr lang="es-ES" sz="2000" dirty="0" smtClean="0"/>
-              <a:t>objetivo</a:t>
-            </a:r>
-            <a:r>
-              <a:rPr lang="es-ES" sz="2000" dirty="0"/>
-              <a:t>.</a:t>
-            </a:r>
-            <a:endParaRPr lang="es-ES_tradnl" sz="2000" dirty="0" smtClean="0"/>
+              <a:t>Pero en particular, ésta aplicación pretende obtener una forma diferente y efectiva de aprender y cumplirá con su objetivo.</a:t>
+            </a:r>
+            <a:endParaRPr lang="es-ES_tradnl" sz="2000" dirty="0"/>
           </a:p>
         </p:txBody>
       </p:sp>
@@ -7004,26 +6699,13 @@
           <a:p>
             <a:pPr algn="r"/>
             <a:r>
-              <a:rPr lang="es-ES_tradnl" sz="3800" dirty="0" smtClean="0">
+              <a:rPr lang="es-ES_tradnl" sz="3800" dirty="0">
                 <a:solidFill>
                   <a:srgbClr val="007D00"/>
                 </a:solidFill>
               </a:rPr>
-              <a:t>Innovaci</a:t>
-            </a:r>
-            <a:r>
-              <a:rPr lang="es-ES_tradnl" sz="3800" dirty="0" smtClean="0">
-                <a:solidFill>
-                  <a:srgbClr val="007D00"/>
-                </a:solidFill>
-              </a:rPr>
-              <a:t>ón</a:t>
-            </a:r>
-            <a:endParaRPr lang="es-ES_tradnl" sz="3800" dirty="0">
-              <a:solidFill>
-                <a:srgbClr val="007D00"/>
-              </a:solidFill>
-            </a:endParaRPr>
+              <a:t>Innovación</a:t>
+            </a:r>
           </a:p>
         </p:txBody>
       </p:sp>
@@ -7072,16 +6754,9 @@
   <p:clrMapOvr>
     <a:masterClrMapping/>
   </p:clrMapOvr>
-  <p:transition xmlns:p14="http://schemas.microsoft.com/office/powerpoint/2010/main" spd="slow">
+  <p:transition spd="slow">
     <p:push dir="u"/>
   </p:transition>
-  <p:timing>
-    <p:tnLst>
-      <p:par>
-        <p:cTn xmlns:p14="http://schemas.microsoft.com/office/powerpoint/2010/main" id="1" dur="indefinite" restart="never" nodeType="tmRoot"/>
-      </p:par>
-    </p:tnLst>
-  </p:timing>
 </p:sld>
 </file>
 
@@ -7147,14 +6822,6 @@
           </a:p>
           <a:p>
             <a:pPr algn="r"/>
-            <a:r>
-              <a:rPr lang="ro-RO" dirty="0">
-                <a:solidFill>
-                  <a:srgbClr val="007D00"/>
-                </a:solidFill>
-              </a:rPr>
-              <a:t/>
-            </a:r>
             <a:br>
               <a:rPr lang="ro-RO" dirty="0">
                 <a:solidFill>
@@ -7290,23 +6957,7 @@
             <a:pPr algn="just"/>
             <a:r>
               <a:rPr lang="es-ES" sz="2000" dirty="0"/>
-              <a:t>Para poder atraer la atención estudiantil se ha revisado el tema de diseño de App Móviles para  niños y </a:t>
-            </a:r>
-            <a:r>
-              <a:rPr lang="es-ES" sz="2000" dirty="0" smtClean="0"/>
-              <a:t>hace menci</a:t>
-            </a:r>
-            <a:r>
-              <a:rPr lang="es-ES" sz="2000" dirty="0" smtClean="0"/>
-              <a:t>ón a </a:t>
-            </a:r>
-            <a:r>
-              <a:rPr lang="es-ES" sz="2000" dirty="0" smtClean="0"/>
-              <a:t>que </a:t>
-            </a:r>
-            <a:r>
-              <a:rPr lang="es-ES" sz="2000" dirty="0"/>
-              <a:t>u</a:t>
+              <a:t>Para poder atraer la atención estudiantil se ha revisado el tema de diseño de App Móviles para  niños y hace mención a que u</a:t>
             </a:r>
             <a:r>
               <a:rPr lang="es-ES_tradnl" sz="2000" dirty="0" err="1"/>
@@ -7340,7 +6991,6 @@
               <a:rPr lang="es-ES_tradnl" sz="2000" dirty="0"/>
               <a:t> tiene más de un juego deben de encontrarse en el mismo apartado. Por otro lado, los botones deben de distinguirse para que los niños sepan que son interactivos. </a:t>
             </a:r>
-            <a:endParaRPr lang="es-ES_tradnl" sz="2000" dirty="0" smtClean="0"/>
           </a:p>
           <a:p>
             <a:pPr algn="just"/>
@@ -7359,7 +7009,7 @@
           </a:p>
           <a:p>
             <a:pPr algn="just"/>
-            <a:endParaRPr lang="es-ES_tradnl" sz="2000" dirty="0" smtClean="0"/>
+            <a:endParaRPr lang="es-ES_tradnl" sz="2000" dirty="0"/>
           </a:p>
         </p:txBody>
       </p:sp>
@@ -7386,26 +7036,13 @@
           <a:p>
             <a:pPr algn="r"/>
             <a:r>
-              <a:rPr lang="es-ES_tradnl" sz="3800" dirty="0" smtClean="0">
+              <a:rPr lang="es-ES_tradnl" sz="3800" dirty="0">
                 <a:solidFill>
                   <a:srgbClr val="007D00"/>
                 </a:solidFill>
               </a:rPr>
-              <a:t>Innovaci</a:t>
-            </a:r>
-            <a:r>
-              <a:rPr lang="es-ES_tradnl" sz="3800" dirty="0" smtClean="0">
-                <a:solidFill>
-                  <a:srgbClr val="007D00"/>
-                </a:solidFill>
-              </a:rPr>
-              <a:t>ón</a:t>
-            </a:r>
-            <a:endParaRPr lang="es-ES_tradnl" sz="3800" dirty="0">
-              <a:solidFill>
-                <a:srgbClr val="007D00"/>
-              </a:solidFill>
-            </a:endParaRPr>
+              <a:t>Innovación</a:t>
+            </a:r>
           </a:p>
         </p:txBody>
       </p:sp>
@@ -7454,16 +7091,9 @@
   <p:clrMapOvr>
     <a:masterClrMapping/>
   </p:clrMapOvr>
-  <p:transition xmlns:p14="http://schemas.microsoft.com/office/powerpoint/2010/main" spd="slow">
+  <p:transition spd="slow">
     <p:push dir="u"/>
   </p:transition>
-  <p:timing>
-    <p:tnLst>
-      <p:par>
-        <p:cTn xmlns:p14="http://schemas.microsoft.com/office/powerpoint/2010/main" id="1" dur="indefinite" restart="never" nodeType="tmRoot"/>
-      </p:par>
-    </p:tnLst>
-  </p:timing>
 </p:sld>
 </file>
 
@@ -7529,14 +7159,6 @@
           </a:p>
           <a:p>
             <a:pPr algn="r"/>
-            <a:r>
-              <a:rPr lang="ro-RO" dirty="0">
-                <a:solidFill>
-                  <a:srgbClr val="007D00"/>
-                </a:solidFill>
-              </a:rPr>
-              <a:t/>
-            </a:r>
             <a:br>
               <a:rPr lang="ro-RO" dirty="0">
                 <a:solidFill>
@@ -7673,7 +7295,7 @@
               <a:buFont typeface="Wingdings" charset="2"/>
               <a:buChar char="ü"/>
             </a:pPr>
-            <a:endParaRPr lang="es-ES_tradnl" sz="2000" dirty="0" smtClean="0"/>
+            <a:endParaRPr lang="es-ES_tradnl" sz="2000" dirty="0"/>
           </a:p>
           <a:p>
             <a:pPr marL="342900" indent="-342900" algn="just">
@@ -7684,18 +7306,11 @@
               <a:buChar char="ü"/>
             </a:pPr>
             <a:r>
-              <a:rPr lang="es-ES_tradnl" sz="2000" dirty="0" smtClean="0">
-                <a:latin typeface="Cambria"/>
-                <a:cs typeface="Cambria"/>
-              </a:rPr>
-              <a:t>El </a:t>
-            </a:r>
-            <a:r>
               <a:rPr lang="es-ES_tradnl" sz="2000" dirty="0">
                 <a:latin typeface="Cambria"/>
                 <a:cs typeface="Cambria"/>
               </a:rPr>
-              <a:t>proyecto consiste en la creación de una aplicación móvil que permitirá al usuario (alumno) aprender todos los elementos de la tabla periódica de una forma rápida y entretenida, ésta aplicación tendrá varias formas de juego y además una capacitación que le permitirá reforzar conocimientos.</a:t>
+              <a:t>El proyecto consiste en la creación de una aplicación móvil que permitirá al usuario (alumno) aprender todos los elementos de la tabla periódica de una forma rápida y entretenida, ésta aplicación tendrá varias formas de juego y además una capacitación que le permitirá reforzar conocimientos.</a:t>
             </a:r>
           </a:p>
           <a:p>
@@ -7703,7 +7318,7 @@
               <a:buFont typeface="Wingdings" charset="2"/>
               <a:buChar char="ü"/>
             </a:pPr>
-            <a:endParaRPr lang="es-ES" sz="2000" dirty="0" smtClean="0"/>
+            <a:endParaRPr lang="es-ES" sz="2000" dirty="0"/>
           </a:p>
           <a:p>
             <a:pPr marL="342900" indent="-342900" algn="just">
@@ -7725,7 +7340,7 @@
           </a:p>
           <a:p>
             <a:pPr algn="just"/>
-            <a:endParaRPr lang="es-ES_tradnl" sz="2000" dirty="0" smtClean="0"/>
+            <a:endParaRPr lang="es-ES_tradnl" sz="2000" dirty="0"/>
           </a:p>
         </p:txBody>
       </p:sp>
@@ -7752,18 +7367,13 @@
           <a:p>
             <a:pPr algn="r"/>
             <a:r>
-              <a:rPr lang="es-ES_tradnl" sz="3800" dirty="0" smtClean="0">
+              <a:rPr lang="es-ES_tradnl" sz="3800" dirty="0">
                 <a:solidFill>
                   <a:srgbClr val="007D00"/>
                 </a:solidFill>
               </a:rPr>
               <a:t>¿En qué consiste?</a:t>
             </a:r>
-            <a:endParaRPr lang="es-ES_tradnl" sz="3800" dirty="0">
-              <a:solidFill>
-                <a:srgbClr val="007D00"/>
-              </a:solidFill>
-            </a:endParaRPr>
           </a:p>
         </p:txBody>
       </p:sp>
@@ -7777,16 +7387,9 @@
   <p:clrMapOvr>
     <a:masterClrMapping/>
   </p:clrMapOvr>
-  <p:transition xmlns:p14="http://schemas.microsoft.com/office/powerpoint/2010/main" spd="slow">
+  <p:transition spd="slow">
     <p:push dir="u"/>
   </p:transition>
-  <p:timing>
-    <p:tnLst>
-      <p:par>
-        <p:cTn xmlns:p14="http://schemas.microsoft.com/office/powerpoint/2010/main" id="1" dur="indefinite" restart="never" nodeType="tmRoot"/>
-      </p:par>
-    </p:tnLst>
-  </p:timing>
 </p:sld>
 </file>
 
@@ -7845,7 +7448,7 @@
           <a:p>
             <a:pPr algn="r"/>
             <a:r>
-              <a:rPr lang="es-ES_tradnl" sz="3800" dirty="0" smtClean="0">
+              <a:rPr lang="es-ES_tradnl" sz="3800" dirty="0">
                 <a:solidFill>
                   <a:srgbClr val="007D00"/>
                 </a:solidFill>
@@ -8022,41 +7625,6 @@
           </a:p>
         </p:txBody>
       </p:sp>
-      <p:pic>
-        <p:nvPicPr>
-          <p:cNvPr id="3" name="Imagen 2"/>
-          <p:cNvPicPr>
-            <a:picLocks noChangeAspect="1"/>
-          </p:cNvPicPr>
-          <p:nvPr/>
-        </p:nvPicPr>
-        <p:blipFill>
-          <a:blip r:embed="rId3">
-            <a:clrChange>
-              <a:clrFrom>
-                <a:srgbClr val="FFFFFF"/>
-              </a:clrFrom>
-              <a:clrTo>
-                <a:srgbClr val="FFFFFF">
-                  <a:alpha val="0"/>
-                </a:srgbClr>
-              </a:clrTo>
-            </a:clrChange>
-          </a:blip>
-          <a:stretch>
-            <a:fillRect/>
-          </a:stretch>
-        </p:blipFill>
-        <p:spPr>
-          <a:xfrm>
-            <a:off x="2566688" y="3608250"/>
-            <a:ext cx="3615642" cy="2711732"/>
-          </a:xfrm>
-          <a:prstGeom prst="rect">
-            <a:avLst/>
-          </a:prstGeom>
-        </p:spPr>
-      </p:pic>
     </p:spTree>
     <p:extLst>
       <p:ext uri="{BB962C8B-B14F-4D97-AF65-F5344CB8AC3E}">
@@ -8067,16 +7635,9 @@
   <p:clrMapOvr>
     <a:masterClrMapping/>
   </p:clrMapOvr>
-  <p:transition xmlns:p14="http://schemas.microsoft.com/office/powerpoint/2010/main" spd="slow">
+  <p:transition spd="slow">
     <p:push dir="u"/>
   </p:transition>
-  <p:timing>
-    <p:tnLst>
-      <p:par>
-        <p:cTn xmlns:p14="http://schemas.microsoft.com/office/powerpoint/2010/main" id="1" dur="indefinite" restart="never" nodeType="tmRoot"/>
-      </p:par>
-    </p:tnLst>
-  </p:timing>
 </p:sld>
 </file>
 
@@ -8120,18 +7681,13 @@
           <a:p>
             <a:pPr algn="r"/>
             <a:r>
-              <a:rPr lang="es-ES_tradnl" sz="3800" dirty="0" smtClean="0">
+              <a:rPr lang="es-ES_tradnl" sz="3800" dirty="0">
                 <a:solidFill>
                   <a:srgbClr val="007D00"/>
                 </a:solidFill>
               </a:rPr>
               <a:t>¿Qué se espera?</a:t>
             </a:r>
-            <a:endParaRPr lang="es-ES_tradnl" sz="3800" dirty="0">
-              <a:solidFill>
-                <a:srgbClr val="007D00"/>
-              </a:solidFill>
-            </a:endParaRPr>
           </a:p>
         </p:txBody>
       </p:sp>
@@ -8168,28 +7724,7 @@
                 <a:latin typeface="Cambria"/>
                 <a:cs typeface="Cambria"/>
               </a:rPr>
-              <a:t>T</a:t>
-            </a:r>
-            <a:r>
-              <a:rPr lang="es-ES_tradnl" sz="2000" dirty="0" smtClean="0">
-                <a:latin typeface="Cambria"/>
-                <a:cs typeface="Cambria"/>
-              </a:rPr>
-              <a:t>ener </a:t>
-            </a:r>
-            <a:r>
-              <a:rPr lang="es-ES_tradnl" sz="2000" dirty="0">
-                <a:latin typeface="Cambria"/>
-                <a:cs typeface="Cambria"/>
-              </a:rPr>
-              <a:t>la aplicación totalmente funcional cumpliendo su principal objetivo, trabajar en tiempo y forma establecida, realizar pruebas finales a usuarios que estén cursando el primer año de secundaria para validar resultados y seguir mejorando en caso de alguna falla</a:t>
-            </a:r>
-            <a:r>
-              <a:rPr lang="es-ES_tradnl" sz="2000" dirty="0" smtClean="0">
-                <a:latin typeface="Cambria"/>
-                <a:cs typeface="Cambria"/>
-              </a:rPr>
-              <a:t>.</a:t>
+              <a:t>Tener la aplicación totalmente funcional cumpliendo su principal objetivo, trabajar en tiempo y forma establecida, realizar pruebas finales a usuarios que estén cursando el primer año de secundaria para validar resultados y seguir mejorando en caso de alguna falla.</a:t>
             </a:r>
           </a:p>
           <a:p>
@@ -8214,20 +7749,8 @@
               <a:buChar char="ü"/>
             </a:pPr>
             <a:r>
-              <a:rPr lang="es-ES" sz="2000" dirty="0" smtClean="0"/>
-              <a:t>Contribuir </a:t>
-            </a:r>
-            <a:r>
               <a:rPr lang="es-ES" sz="2000" dirty="0"/>
-              <a:t>con </a:t>
-            </a:r>
-            <a:r>
-              <a:rPr lang="es-ES" sz="2000" dirty="0" smtClean="0"/>
-              <a:t>el desempeño </a:t>
-            </a:r>
-            <a:r>
-              <a:rPr lang="es-ES" sz="2000" dirty="0"/>
-              <a:t>académico de los estudiantes.</a:t>
+              <a:t>Contribuir con el desempeño académico de los estudiantes.</a:t>
             </a:r>
             <a:endParaRPr lang="es-ES_tradnl" sz="2000" dirty="0"/>
           </a:p>
@@ -8261,30 +7784,6 @@
           </a:p>
         </p:txBody>
       </p:sp>
-      <p:pic>
-        <p:nvPicPr>
-          <p:cNvPr id="4" name="Imagen 3"/>
-          <p:cNvPicPr>
-            <a:picLocks noChangeAspect="1"/>
-          </p:cNvPicPr>
-          <p:nvPr/>
-        </p:nvPicPr>
-        <p:blipFill>
-          <a:blip r:embed="rId2"/>
-          <a:stretch>
-            <a:fillRect/>
-          </a:stretch>
-        </p:blipFill>
-        <p:spPr>
-          <a:xfrm>
-            <a:off x="5841536" y="4977832"/>
-            <a:ext cx="3218919" cy="1813324"/>
-          </a:xfrm>
-          <a:prstGeom prst="rect">
-            <a:avLst/>
-          </a:prstGeom>
-        </p:spPr>
-      </p:pic>
     </p:spTree>
     <p:extLst>
       <p:ext uri="{BB962C8B-B14F-4D97-AF65-F5344CB8AC3E}">
@@ -8295,13 +7794,6 @@
   <p:clrMapOvr>
     <a:masterClrMapping/>
   </p:clrMapOvr>
-  <p:timing>
-    <p:tnLst>
-      <p:par>
-        <p:cTn xmlns:p14="http://schemas.microsoft.com/office/powerpoint/2010/main" id="1" dur="indefinite" restart="never" nodeType="tmRoot"/>
-      </p:par>
-    </p:tnLst>
-  </p:timing>
 </p:sld>
 </file>
 

</xml_diff>